<commit_message>
Updated slides from Nicolas
</commit_message>
<xml_diff>
--- a/QUIC_and_Satellite_Open_Stakeholder_Meeting_Accelerating_Start-up_v2.pptx
+++ b/QUIC_and_Satellite_Open_Stakeholder_Meeting_Accelerating_Start-up_v2.pptx
@@ -7,7 +7,7 @@
     <p:sldMasterId id="2147483786" r:id="rId7"/>
   </p:sldMasterIdLst>
   <p:notesMasterIdLst>
-    <p:notesMasterId r:id="rId18"/>
+    <p:notesMasterId r:id="rId21"/>
   </p:notesMasterIdLst>
   <p:sldIdLst>
     <p:sldId id="256" r:id="rId8"/>
@@ -20,6 +20,9 @@
     <p:sldId id="307" r:id="rId15"/>
     <p:sldId id="308" r:id="rId16"/>
     <p:sldId id="309" r:id="rId17"/>
+    <p:sldId id="310" r:id="rId18"/>
+    <p:sldId id="311" r:id="rId19"/>
+    <p:sldId id="312" r:id="rId20"/>
   </p:sldIdLst>
   <p:sldSz cx="9144000" cy="5715000" type="screen16x10"/>
   <p:notesSz cx="6858000" cy="9144000"/>
@@ -133,6 +136,9 @@
             <p14:sldId id="307"/>
             <p14:sldId id="308"/>
             <p14:sldId id="309"/>
+            <p14:sldId id="310"/>
+            <p14:sldId id="311"/>
+            <p14:sldId id="312"/>
           </p14:sldIdLst>
         </p14:section>
       </p14:sectionLst>
@@ -237,7 +243,7 @@
           <a:p>
             <a:fld id="{31B93242-A1A9-CC43-A2EE-9EE798A2CEAF}" type="datetimeFigureOut">
               <a:rPr lang="fr-FR" smtClean="0"/>
-              <a:t>03/11/2020</a:t>
+              <a:t>04/11/2020</a:t>
             </a:fld>
             <a:endParaRPr lang="fr-FR"/>
           </a:p>
@@ -6122,7 +6128,6 @@
               <a:rPr lang="en-US" dirty="0"/>
               <a:t>Summary</a:t>
             </a:r>
-            <a:endParaRPr lang="en-US" dirty="0"/>
           </a:p>
         </p:txBody>
       </p:sp>
@@ -6199,11 +6204,7 @@
             </a:pPr>
             <a:r>
               <a:rPr lang="en-US" dirty="0" smtClean="0"/>
-              <a:t>We are working at </a:t>
-            </a:r>
-            <a:r>
-              <a:rPr lang="en-US" dirty="0" smtClean="0"/>
-              <a:t>IETF on this</a:t>
+              <a:t>We are working at IETF on this</a:t>
             </a:r>
           </a:p>
           <a:p>
@@ -6240,11 +6241,7 @@
             </a:pPr>
             <a:r>
               <a:rPr lang="en-US" dirty="0" smtClean="0"/>
-              <a:t>Or discuss ou</a:t>
-            </a:r>
-            <a:r>
-              <a:rPr lang="en-US" dirty="0" smtClean="0"/>
-              <a:t>r drafts</a:t>
+              <a:t>Or discuss our drafts</a:t>
             </a:r>
           </a:p>
           <a:p>
@@ -6282,11 +6279,7 @@
             </a:pPr>
             <a:r>
               <a:rPr lang="en-US" dirty="0" smtClean="0"/>
-              <a:t>On </a:t>
-            </a:r>
-            <a:r>
-              <a:rPr lang="en-US" dirty="0" smtClean="0"/>
-              <a:t>the median case</a:t>
+              <a:t>On the median case</a:t>
             </a:r>
           </a:p>
           <a:p>
@@ -6370,7 +6363,6 @@
               <a:rPr lang="en-US" dirty="0" smtClean="0"/>
               <a:t> on the end-to-end performance of QUIC ? </a:t>
             </a:r>
-            <a:endParaRPr lang="en-US" dirty="0" smtClean="0"/>
           </a:p>
           <a:p>
             <a:pPr marL="702900" lvl="1" indent="-342900">
@@ -6425,6 +6417,867 @@
     <p:extLst>
       <p:ext uri="{BB962C8B-B14F-4D97-AF65-F5344CB8AC3E}">
         <p14:creationId xmlns:p14="http://schemas.microsoft.com/office/powerpoint/2010/main" val="260029801"/>
+      </p:ext>
+    </p:extLst>
+  </p:cSld>
+  <p:clrMapOvr>
+    <a:masterClrMapping/>
+  </p:clrMapOvr>
+  <p:timing>
+    <p:tnLst>
+      <p:par>
+        <p:cTn id="1" dur="indefinite" restart="never" nodeType="tmRoot"/>
+      </p:par>
+    </p:tnLst>
+  </p:timing>
+</p:sld>
+</file>
+
+<file path=ppt/slides/slide11.xml><?xml version="1.0" encoding="utf-8"?>
+<p:sld xmlns:a="http://schemas.openxmlformats.org/drawingml/2006/main" xmlns:r="http://schemas.openxmlformats.org/officeDocument/2006/relationships" xmlns:p="http://schemas.openxmlformats.org/presentationml/2006/main">
+  <p:cSld>
+    <p:spTree>
+      <p:nvGrpSpPr>
+        <p:cNvPr id="1" name=""/>
+        <p:cNvGrpSpPr/>
+        <p:nvPr/>
+      </p:nvGrpSpPr>
+      <p:grpSpPr>
+        <a:xfrm>
+          <a:off x="0" y="0"/>
+          <a:ext cx="0" cy="0"/>
+          <a:chOff x="0" y="0"/>
+          <a:chExt cx="0" cy="0"/>
+        </a:xfrm>
+      </p:grpSpPr>
+      <p:sp>
+        <p:nvSpPr>
+          <p:cNvPr id="6" name="Titre 5"/>
+          <p:cNvSpPr>
+            <a:spLocks noGrp="1"/>
+          </p:cNvSpPr>
+          <p:nvPr>
+            <p:ph type="title"/>
+          </p:nvPr>
+        </p:nvSpPr>
+        <p:spPr>
+          <a:xfrm>
+            <a:off x="297712" y="647123"/>
+            <a:ext cx="7230619" cy="369332"/>
+          </a:xfrm>
+        </p:spPr>
+        <p:txBody>
+          <a:bodyPr/>
+          <a:lstStyle/>
+          <a:p>
+            <a:r>
+              <a:rPr lang="en-US" dirty="0" smtClean="0"/>
+              <a:t>Appendix – impact of losses</a:t>
+            </a:r>
+            <a:endParaRPr lang="en-US" dirty="0"/>
+          </a:p>
+        </p:txBody>
+      </p:sp>
+      <p:sp>
+        <p:nvSpPr>
+          <p:cNvPr id="3" name="Espace réservé du numéro de diapositive 2"/>
+          <p:cNvSpPr>
+            <a:spLocks noGrp="1"/>
+          </p:cNvSpPr>
+          <p:nvPr>
+            <p:ph type="sldNum" sz="quarter" idx="12"/>
+          </p:nvPr>
+        </p:nvSpPr>
+        <p:spPr/>
+        <p:txBody>
+          <a:bodyPr/>
+          <a:lstStyle/>
+          <a:p>
+            <a:fld id="{62B8EFC2-1E6F-E543-8F2B-2782CBB9317F}" type="slidenum">
+              <a:rPr lang="fr-FR" smtClean="0"/>
+              <a:t>11</a:t>
+            </a:fld>
+            <a:endParaRPr lang="fr-FR"/>
+          </a:p>
+        </p:txBody>
+      </p:sp>
+      <p:sp>
+        <p:nvSpPr>
+          <p:cNvPr id="7" name="Sous-titre 6"/>
+          <p:cNvSpPr>
+            <a:spLocks noGrp="1"/>
+          </p:cNvSpPr>
+          <p:nvPr>
+            <p:ph type="subTitle" idx="14"/>
+          </p:nvPr>
+        </p:nvSpPr>
+        <p:spPr/>
+        <p:txBody>
+          <a:bodyPr/>
+          <a:lstStyle/>
+          <a:p>
+            <a:r>
+              <a:rPr lang="en-US" dirty="0"/>
+              <a:t>QUIC and Satellite Open Stakeholder Meeting - Accelerating Start-up</a:t>
+            </a:r>
+          </a:p>
+        </p:txBody>
+      </p:sp>
+      <p:pic>
+        <p:nvPicPr>
+          <p:cNvPr id="8" name="Image 7">
+            <a:extLst>
+              <a:ext uri="{FF2B5EF4-FFF2-40B4-BE49-F238E27FC236}">
+                <a16:creationId xmlns:a16="http://schemas.microsoft.com/office/drawing/2014/main" id="{D07AB026-E6FE-4B38-AD8B-2C96435D4F2B}"/>
+              </a:ext>
+            </a:extLst>
+          </p:cNvPr>
+          <p:cNvPicPr>
+            <a:picLocks noChangeAspect="1"/>
+          </p:cNvPicPr>
+          <p:nvPr/>
+        </p:nvPicPr>
+        <p:blipFill>
+          <a:blip r:embed="rId2"/>
+          <a:stretch>
+            <a:fillRect/>
+          </a:stretch>
+        </p:blipFill>
+        <p:spPr>
+          <a:xfrm>
+            <a:off x="7464056" y="646470"/>
+            <a:ext cx="866117" cy="395683"/>
+          </a:xfrm>
+          <a:prstGeom prst="rect">
+            <a:avLst/>
+          </a:prstGeom>
+        </p:spPr>
+      </p:pic>
+      <p:pic>
+        <p:nvPicPr>
+          <p:cNvPr id="9" name="Image 8"/>
+          <p:cNvPicPr>
+            <a:picLocks noChangeAspect="1"/>
+          </p:cNvPicPr>
+          <p:nvPr/>
+        </p:nvPicPr>
+        <p:blipFill>
+          <a:blip r:embed="rId3"/>
+          <a:stretch>
+            <a:fillRect/>
+          </a:stretch>
+        </p:blipFill>
+        <p:spPr>
+          <a:xfrm>
+            <a:off x="1392019" y="1206500"/>
+            <a:ext cx="5656481" cy="2455610"/>
+          </a:xfrm>
+          <a:prstGeom prst="rect">
+            <a:avLst/>
+          </a:prstGeom>
+        </p:spPr>
+      </p:pic>
+      <p:sp>
+        <p:nvSpPr>
+          <p:cNvPr id="10" name="ZoneTexte 9"/>
+          <p:cNvSpPr txBox="1"/>
+          <p:nvPr/>
+        </p:nvSpPr>
+        <p:spPr>
+          <a:xfrm>
+            <a:off x="415630" y="989229"/>
+            <a:ext cx="2095445" cy="286232"/>
+          </a:xfrm>
+          <a:prstGeom prst="rect">
+            <a:avLst/>
+          </a:prstGeom>
+        </p:spPr>
+        <p:txBody>
+          <a:bodyPr/>
+          <a:lstStyle>
+            <a:defPPr>
+              <a:defRPr lang="fr-FR"/>
+            </a:defPPr>
+            <a:lvl1pPr indent="0" defTabSz="914400">
+              <a:lnSpc>
+                <a:spcPct val="90000"/>
+              </a:lnSpc>
+              <a:spcBef>
+                <a:spcPts val="1000"/>
+              </a:spcBef>
+              <a:buFont typeface="Arial"/>
+              <a:buNone/>
+              <a:defRPr sz="1400" b="1">
+                <a:solidFill>
+                  <a:srgbClr val="002060"/>
+                </a:solidFill>
+                <a:latin typeface="Arial" charset="0"/>
+                <a:ea typeface="Arial" charset="0"/>
+                <a:cs typeface="Arial" charset="0"/>
+              </a:defRPr>
+            </a:lvl1pPr>
+            <a:lvl2pPr marL="360000" lvl="1" indent="-228600" defTabSz="914400">
+              <a:lnSpc>
+                <a:spcPct val="90000"/>
+              </a:lnSpc>
+              <a:spcBef>
+                <a:spcPts val="500"/>
+              </a:spcBef>
+              <a:buFont typeface=".AppleSystemUIFont" charset="-120"/>
+              <a:buChar char="-"/>
+              <a:defRPr sz="1200">
+                <a:solidFill>
+                  <a:srgbClr val="002060"/>
+                </a:solidFill>
+                <a:latin typeface="Arial" charset="0"/>
+                <a:ea typeface="Arial" charset="0"/>
+                <a:cs typeface="Arial" charset="0"/>
+              </a:defRPr>
+            </a:lvl2pPr>
+            <a:lvl3pPr marL="612000" indent="-228600" defTabSz="914400">
+              <a:lnSpc>
+                <a:spcPct val="90000"/>
+              </a:lnSpc>
+              <a:spcBef>
+                <a:spcPts val="500"/>
+              </a:spcBef>
+              <a:buFont typeface="Arial"/>
+              <a:buChar char="•"/>
+              <a:defRPr sz="1600">
+                <a:solidFill>
+                  <a:srgbClr val="002060"/>
+                </a:solidFill>
+                <a:latin typeface="Arial" charset="0"/>
+                <a:ea typeface="Arial" charset="0"/>
+                <a:cs typeface="Arial" charset="0"/>
+              </a:defRPr>
+            </a:lvl3pPr>
+            <a:lvl4pPr marL="1600200" indent="-228600" defTabSz="914400">
+              <a:lnSpc>
+                <a:spcPct val="90000"/>
+              </a:lnSpc>
+              <a:spcBef>
+                <a:spcPts val="500"/>
+              </a:spcBef>
+              <a:buFont typeface="Arial"/>
+              <a:buChar char="•"/>
+              <a:defRPr sz="1800">
+                <a:solidFill>
+                  <a:srgbClr val="002060"/>
+                </a:solidFill>
+                <a:latin typeface="Arial" charset="0"/>
+                <a:ea typeface="Arial" charset="0"/>
+                <a:cs typeface="Arial" charset="0"/>
+              </a:defRPr>
+            </a:lvl4pPr>
+            <a:lvl5pPr marL="2057400" indent="-228600" defTabSz="914400">
+              <a:lnSpc>
+                <a:spcPct val="90000"/>
+              </a:lnSpc>
+              <a:spcBef>
+                <a:spcPts val="500"/>
+              </a:spcBef>
+              <a:buFont typeface="Arial"/>
+              <a:buChar char="•"/>
+              <a:defRPr sz="1800">
+                <a:solidFill>
+                  <a:srgbClr val="002060"/>
+                </a:solidFill>
+                <a:latin typeface="Arial" charset="0"/>
+                <a:ea typeface="Arial" charset="0"/>
+                <a:cs typeface="Arial" charset="0"/>
+              </a:defRPr>
+            </a:lvl5pPr>
+            <a:lvl6pPr marL="2514600" indent="-228600" defTabSz="914400">
+              <a:lnSpc>
+                <a:spcPct val="90000"/>
+              </a:lnSpc>
+              <a:spcBef>
+                <a:spcPts val="500"/>
+              </a:spcBef>
+              <a:buFont typeface="Arial"/>
+              <a:buChar char="•"/>
+              <a:defRPr sz="1800"/>
+            </a:lvl6pPr>
+            <a:lvl7pPr marL="2971800" indent="-228600" defTabSz="914400">
+              <a:lnSpc>
+                <a:spcPct val="90000"/>
+              </a:lnSpc>
+              <a:spcBef>
+                <a:spcPts val="500"/>
+              </a:spcBef>
+              <a:buFont typeface="Arial"/>
+              <a:buChar char="•"/>
+              <a:defRPr sz="1800"/>
+            </a:lvl7pPr>
+            <a:lvl8pPr marL="3429000" indent="-228600" defTabSz="914400">
+              <a:lnSpc>
+                <a:spcPct val="90000"/>
+              </a:lnSpc>
+              <a:spcBef>
+                <a:spcPts val="500"/>
+              </a:spcBef>
+              <a:buFont typeface="Arial"/>
+              <a:buChar char="•"/>
+              <a:defRPr sz="1800"/>
+            </a:lvl8pPr>
+            <a:lvl9pPr marL="3886200" indent="-228600" defTabSz="914400">
+              <a:lnSpc>
+                <a:spcPct val="90000"/>
+              </a:lnSpc>
+              <a:spcBef>
+                <a:spcPts val="500"/>
+              </a:spcBef>
+              <a:buFont typeface="Arial"/>
+              <a:buChar char="•"/>
+              <a:defRPr sz="1800"/>
+            </a:lvl9pPr>
+          </a:lstStyle>
+          <a:p>
+            <a:r>
+              <a:rPr lang="fr-FR" dirty="0"/>
+              <a:t>ISAE server (</a:t>
+            </a:r>
+            <a:r>
+              <a:rPr lang="fr-FR" dirty="0" err="1"/>
+              <a:t>picoquic</a:t>
+            </a:r>
+            <a:r>
+              <a:rPr lang="fr-FR" dirty="0"/>
+              <a:t>)</a:t>
+            </a:r>
+          </a:p>
+        </p:txBody>
+      </p:sp>
+      <p:sp>
+        <p:nvSpPr>
+          <p:cNvPr id="11" name="Rectangle 10"/>
+          <p:cNvSpPr/>
+          <p:nvPr/>
+        </p:nvSpPr>
+        <p:spPr>
+          <a:xfrm>
+            <a:off x="2061210" y="1599595"/>
+            <a:ext cx="4963579" cy="1203854"/>
+          </a:xfrm>
+          <a:prstGeom prst="rect">
+            <a:avLst/>
+          </a:prstGeom>
+          <a:noFill/>
+          <a:ln w="38100">
+            <a:solidFill>
+              <a:srgbClr val="FF0000"/>
+            </a:solidFill>
+          </a:ln>
+        </p:spPr>
+        <p:style>
+          <a:lnRef idx="2">
+            <a:schemeClr val="accent1">
+              <a:shade val="50000"/>
+            </a:schemeClr>
+          </a:lnRef>
+          <a:fillRef idx="1">
+            <a:schemeClr val="accent1"/>
+          </a:fillRef>
+          <a:effectRef idx="0">
+            <a:schemeClr val="accent1"/>
+          </a:effectRef>
+          <a:fontRef idx="minor">
+            <a:schemeClr val="lt1"/>
+          </a:fontRef>
+        </p:style>
+        <p:txBody>
+          <a:bodyPr rtlCol="0" anchor="ctr"/>
+          <a:lstStyle/>
+          <a:p>
+            <a:pPr algn="ctr"/>
+            <a:endParaRPr lang="fr-FR"/>
+          </a:p>
+        </p:txBody>
+      </p:sp>
+      <p:pic>
+        <p:nvPicPr>
+          <p:cNvPr id="12" name="Image 11"/>
+          <p:cNvPicPr>
+            <a:picLocks noChangeAspect="1"/>
+          </p:cNvPicPr>
+          <p:nvPr/>
+        </p:nvPicPr>
+        <p:blipFill rotWithShape="1">
+          <a:blip r:embed="rId4"/>
+          <a:srcRect l="50750" t="18222" r="7416" b="60445"/>
+          <a:stretch/>
+        </p:blipFill>
+        <p:spPr>
+          <a:xfrm>
+            <a:off x="1545176" y="3662110"/>
+            <a:ext cx="6156960" cy="1766140"/>
+          </a:xfrm>
+          <a:prstGeom prst="rect">
+            <a:avLst/>
+          </a:prstGeom>
+        </p:spPr>
+      </p:pic>
+    </p:spTree>
+    <p:extLst>
+      <p:ext uri="{BB962C8B-B14F-4D97-AF65-F5344CB8AC3E}">
+        <p14:creationId xmlns:p14="http://schemas.microsoft.com/office/powerpoint/2010/main" val="4124660397"/>
+      </p:ext>
+    </p:extLst>
+  </p:cSld>
+  <p:clrMapOvr>
+    <a:masterClrMapping/>
+  </p:clrMapOvr>
+  <p:timing>
+    <p:tnLst>
+      <p:par>
+        <p:cTn id="1" dur="indefinite" restart="never" nodeType="tmRoot"/>
+      </p:par>
+    </p:tnLst>
+  </p:timing>
+</p:sld>
+</file>
+
+<file path=ppt/slides/slide12.xml><?xml version="1.0" encoding="utf-8"?>
+<p:sld xmlns:a="http://schemas.openxmlformats.org/drawingml/2006/main" xmlns:r="http://schemas.openxmlformats.org/officeDocument/2006/relationships" xmlns:p="http://schemas.openxmlformats.org/presentationml/2006/main">
+  <p:cSld>
+    <p:spTree>
+      <p:nvGrpSpPr>
+        <p:cNvPr id="1" name=""/>
+        <p:cNvGrpSpPr/>
+        <p:nvPr/>
+      </p:nvGrpSpPr>
+      <p:grpSpPr>
+        <a:xfrm>
+          <a:off x="0" y="0"/>
+          <a:ext cx="0" cy="0"/>
+          <a:chOff x="0" y="0"/>
+          <a:chExt cx="0" cy="0"/>
+        </a:xfrm>
+      </p:grpSpPr>
+      <p:sp>
+        <p:nvSpPr>
+          <p:cNvPr id="6" name="Titre 5"/>
+          <p:cNvSpPr>
+            <a:spLocks noGrp="1"/>
+          </p:cNvSpPr>
+          <p:nvPr>
+            <p:ph type="title"/>
+          </p:nvPr>
+        </p:nvSpPr>
+        <p:spPr>
+          <a:xfrm>
+            <a:off x="297712" y="647123"/>
+            <a:ext cx="7230619" cy="369332"/>
+          </a:xfrm>
+        </p:spPr>
+        <p:txBody>
+          <a:bodyPr/>
+          <a:lstStyle/>
+          <a:p>
+            <a:r>
+              <a:rPr lang="en-US" dirty="0" smtClean="0"/>
+              <a:t>Appendix – impact of losses</a:t>
+            </a:r>
+            <a:endParaRPr lang="en-US" dirty="0"/>
+          </a:p>
+        </p:txBody>
+      </p:sp>
+      <p:sp>
+        <p:nvSpPr>
+          <p:cNvPr id="3" name="Espace réservé du numéro de diapositive 2"/>
+          <p:cNvSpPr>
+            <a:spLocks noGrp="1"/>
+          </p:cNvSpPr>
+          <p:nvPr>
+            <p:ph type="sldNum" sz="quarter" idx="12"/>
+          </p:nvPr>
+        </p:nvSpPr>
+        <p:spPr/>
+        <p:txBody>
+          <a:bodyPr/>
+          <a:lstStyle/>
+          <a:p>
+            <a:fld id="{62B8EFC2-1E6F-E543-8F2B-2782CBB9317F}" type="slidenum">
+              <a:rPr lang="fr-FR" smtClean="0"/>
+              <a:t>12</a:t>
+            </a:fld>
+            <a:endParaRPr lang="fr-FR"/>
+          </a:p>
+        </p:txBody>
+      </p:sp>
+      <p:sp>
+        <p:nvSpPr>
+          <p:cNvPr id="7" name="Sous-titre 6"/>
+          <p:cNvSpPr>
+            <a:spLocks noGrp="1"/>
+          </p:cNvSpPr>
+          <p:nvPr>
+            <p:ph type="subTitle" idx="14"/>
+          </p:nvPr>
+        </p:nvSpPr>
+        <p:spPr/>
+        <p:txBody>
+          <a:bodyPr/>
+          <a:lstStyle/>
+          <a:p>
+            <a:r>
+              <a:rPr lang="en-US" dirty="0"/>
+              <a:t>QUIC and Satellite Open Stakeholder Meeting - Accelerating Start-up</a:t>
+            </a:r>
+          </a:p>
+        </p:txBody>
+      </p:sp>
+      <p:pic>
+        <p:nvPicPr>
+          <p:cNvPr id="8" name="Image 7">
+            <a:extLst>
+              <a:ext uri="{FF2B5EF4-FFF2-40B4-BE49-F238E27FC236}">
+                <a16:creationId xmlns:a16="http://schemas.microsoft.com/office/drawing/2014/main" id="{D07AB026-E6FE-4B38-AD8B-2C96435D4F2B}"/>
+              </a:ext>
+            </a:extLst>
+          </p:cNvPr>
+          <p:cNvPicPr>
+            <a:picLocks noChangeAspect="1"/>
+          </p:cNvPicPr>
+          <p:nvPr/>
+        </p:nvPicPr>
+        <p:blipFill>
+          <a:blip r:embed="rId2"/>
+          <a:stretch>
+            <a:fillRect/>
+          </a:stretch>
+        </p:blipFill>
+        <p:spPr>
+          <a:xfrm>
+            <a:off x="7464056" y="646470"/>
+            <a:ext cx="866117" cy="395683"/>
+          </a:xfrm>
+          <a:prstGeom prst="rect">
+            <a:avLst/>
+          </a:prstGeom>
+        </p:spPr>
+      </p:pic>
+      <p:pic>
+        <p:nvPicPr>
+          <p:cNvPr id="13" name="Image 12"/>
+          <p:cNvPicPr>
+            <a:picLocks noChangeAspect="1"/>
+          </p:cNvPicPr>
+          <p:nvPr/>
+        </p:nvPicPr>
+        <p:blipFill>
+          <a:blip r:embed="rId3">
+            <a:extLst>
+              <a:ext uri="{28A0092B-C50C-407E-A947-70E740481C1C}">
+                <a14:useLocalDpi xmlns:a14="http://schemas.microsoft.com/office/drawing/2010/main" val="0"/>
+              </a:ext>
+            </a:extLst>
+          </a:blip>
+          <a:stretch>
+            <a:fillRect/>
+          </a:stretch>
+        </p:blipFill>
+        <p:spPr>
+          <a:xfrm>
+            <a:off x="373187" y="1267422"/>
+            <a:ext cx="8138865" cy="1066892"/>
+          </a:xfrm>
+          <a:prstGeom prst="rect">
+            <a:avLst/>
+          </a:prstGeom>
+        </p:spPr>
+      </p:pic>
+      <p:pic>
+        <p:nvPicPr>
+          <p:cNvPr id="14" name="Image 13"/>
+          <p:cNvPicPr>
+            <a:picLocks noChangeAspect="1"/>
+          </p:cNvPicPr>
+          <p:nvPr/>
+        </p:nvPicPr>
+        <p:blipFill>
+          <a:blip r:embed="rId4">
+            <a:extLst>
+              <a:ext uri="{28A0092B-C50C-407E-A947-70E740481C1C}">
+                <a14:useLocalDpi xmlns:a14="http://schemas.microsoft.com/office/drawing/2010/main" val="0"/>
+              </a:ext>
+            </a:extLst>
+          </a:blip>
+          <a:stretch>
+            <a:fillRect/>
+          </a:stretch>
+        </p:blipFill>
+        <p:spPr>
+          <a:xfrm>
+            <a:off x="2368002" y="2747669"/>
+            <a:ext cx="4511308" cy="2195651"/>
+          </a:xfrm>
+          <a:prstGeom prst="rect">
+            <a:avLst/>
+          </a:prstGeom>
+        </p:spPr>
+      </p:pic>
+    </p:spTree>
+    <p:extLst>
+      <p:ext uri="{BB962C8B-B14F-4D97-AF65-F5344CB8AC3E}">
+        <p14:creationId xmlns:p14="http://schemas.microsoft.com/office/powerpoint/2010/main" val="1888978326"/>
+      </p:ext>
+    </p:extLst>
+  </p:cSld>
+  <p:clrMapOvr>
+    <a:masterClrMapping/>
+  </p:clrMapOvr>
+  <p:timing>
+    <p:tnLst>
+      <p:par>
+        <p:cTn id="1" dur="indefinite" restart="never" nodeType="tmRoot"/>
+      </p:par>
+    </p:tnLst>
+  </p:timing>
+</p:sld>
+</file>
+
+<file path=ppt/slides/slide13.xml><?xml version="1.0" encoding="utf-8"?>
+<p:sld xmlns:a="http://schemas.openxmlformats.org/drawingml/2006/main" xmlns:r="http://schemas.openxmlformats.org/officeDocument/2006/relationships" xmlns:p="http://schemas.openxmlformats.org/presentationml/2006/main">
+  <p:cSld>
+    <p:spTree>
+      <p:nvGrpSpPr>
+        <p:cNvPr id="1" name=""/>
+        <p:cNvGrpSpPr/>
+        <p:nvPr/>
+      </p:nvGrpSpPr>
+      <p:grpSpPr>
+        <a:xfrm>
+          <a:off x="0" y="0"/>
+          <a:ext cx="0" cy="0"/>
+          <a:chOff x="0" y="0"/>
+          <a:chExt cx="0" cy="0"/>
+        </a:xfrm>
+      </p:grpSpPr>
+      <p:sp>
+        <p:nvSpPr>
+          <p:cNvPr id="6" name="Titre 5"/>
+          <p:cNvSpPr>
+            <a:spLocks noGrp="1"/>
+          </p:cNvSpPr>
+          <p:nvPr>
+            <p:ph type="title"/>
+          </p:nvPr>
+        </p:nvSpPr>
+        <p:spPr>
+          <a:xfrm>
+            <a:off x="297712" y="647123"/>
+            <a:ext cx="7230619" cy="369332"/>
+          </a:xfrm>
+        </p:spPr>
+        <p:txBody>
+          <a:bodyPr/>
+          <a:lstStyle/>
+          <a:p>
+            <a:r>
+              <a:rPr lang="en-US" dirty="0" smtClean="0"/>
+              <a:t>Appendix – impact of losses</a:t>
+            </a:r>
+            <a:endParaRPr lang="en-US" dirty="0"/>
+          </a:p>
+        </p:txBody>
+      </p:sp>
+      <p:sp>
+        <p:nvSpPr>
+          <p:cNvPr id="3" name="Espace réservé du numéro de diapositive 2"/>
+          <p:cNvSpPr>
+            <a:spLocks noGrp="1"/>
+          </p:cNvSpPr>
+          <p:nvPr>
+            <p:ph type="sldNum" sz="quarter" idx="12"/>
+          </p:nvPr>
+        </p:nvSpPr>
+        <p:spPr/>
+        <p:txBody>
+          <a:bodyPr/>
+          <a:lstStyle/>
+          <a:p>
+            <a:fld id="{62B8EFC2-1E6F-E543-8F2B-2782CBB9317F}" type="slidenum">
+              <a:rPr lang="fr-FR" smtClean="0"/>
+              <a:t>13</a:t>
+            </a:fld>
+            <a:endParaRPr lang="fr-FR"/>
+          </a:p>
+        </p:txBody>
+      </p:sp>
+      <p:sp>
+        <p:nvSpPr>
+          <p:cNvPr id="7" name="Sous-titre 6"/>
+          <p:cNvSpPr>
+            <a:spLocks noGrp="1"/>
+          </p:cNvSpPr>
+          <p:nvPr>
+            <p:ph type="subTitle" idx="14"/>
+          </p:nvPr>
+        </p:nvSpPr>
+        <p:spPr/>
+        <p:txBody>
+          <a:bodyPr/>
+          <a:lstStyle/>
+          <a:p>
+            <a:r>
+              <a:rPr lang="en-US" dirty="0"/>
+              <a:t>QUIC and Satellite Open Stakeholder Meeting - Accelerating Start-up</a:t>
+            </a:r>
+          </a:p>
+        </p:txBody>
+      </p:sp>
+      <p:pic>
+        <p:nvPicPr>
+          <p:cNvPr id="8" name="Image 7">
+            <a:extLst>
+              <a:ext uri="{FF2B5EF4-FFF2-40B4-BE49-F238E27FC236}">
+                <a16:creationId xmlns:a16="http://schemas.microsoft.com/office/drawing/2014/main" id="{D07AB026-E6FE-4B38-AD8B-2C96435D4F2B}"/>
+              </a:ext>
+            </a:extLst>
+          </p:cNvPr>
+          <p:cNvPicPr>
+            <a:picLocks noChangeAspect="1"/>
+          </p:cNvPicPr>
+          <p:nvPr/>
+        </p:nvPicPr>
+        <p:blipFill>
+          <a:blip r:embed="rId2"/>
+          <a:stretch>
+            <a:fillRect/>
+          </a:stretch>
+        </p:blipFill>
+        <p:spPr>
+          <a:xfrm>
+            <a:off x="7464056" y="646470"/>
+            <a:ext cx="866117" cy="395683"/>
+          </a:xfrm>
+          <a:prstGeom prst="rect">
+            <a:avLst/>
+          </a:prstGeom>
+        </p:spPr>
+      </p:pic>
+      <p:pic>
+        <p:nvPicPr>
+          <p:cNvPr id="9" name="Image 8"/>
+          <p:cNvPicPr>
+            <a:picLocks noChangeAspect="1"/>
+          </p:cNvPicPr>
+          <p:nvPr/>
+        </p:nvPicPr>
+        <p:blipFill rotWithShape="1">
+          <a:blip r:embed="rId3">
+            <a:extLst>
+              <a:ext uri="{28A0092B-C50C-407E-A947-70E740481C1C}">
+                <a14:useLocalDpi xmlns:a14="http://schemas.microsoft.com/office/drawing/2010/main" val="0"/>
+              </a:ext>
+            </a:extLst>
+          </a:blip>
+          <a:srcRect t="30891"/>
+          <a:stretch/>
+        </p:blipFill>
+        <p:spPr>
+          <a:xfrm>
+            <a:off x="479721" y="3293356"/>
+            <a:ext cx="4028624" cy="2088122"/>
+          </a:xfrm>
+          <a:prstGeom prst="rect">
+            <a:avLst/>
+          </a:prstGeom>
+        </p:spPr>
+      </p:pic>
+      <p:pic>
+        <p:nvPicPr>
+          <p:cNvPr id="10" name="Image 9"/>
+          <p:cNvPicPr>
+            <a:picLocks noChangeAspect="1"/>
+          </p:cNvPicPr>
+          <p:nvPr/>
+        </p:nvPicPr>
+        <p:blipFill rotWithShape="1">
+          <a:blip r:embed="rId4">
+            <a:extLst>
+              <a:ext uri="{28A0092B-C50C-407E-A947-70E740481C1C}">
+                <a14:useLocalDpi xmlns:a14="http://schemas.microsoft.com/office/drawing/2010/main" val="0"/>
+              </a:ext>
+            </a:extLst>
+          </a:blip>
+          <a:srcRect t="31605"/>
+          <a:stretch/>
+        </p:blipFill>
+        <p:spPr>
+          <a:xfrm>
+            <a:off x="479721" y="1042153"/>
+            <a:ext cx="4028624" cy="2066537"/>
+          </a:xfrm>
+          <a:prstGeom prst="rect">
+            <a:avLst/>
+          </a:prstGeom>
+        </p:spPr>
+      </p:pic>
+      <p:pic>
+        <p:nvPicPr>
+          <p:cNvPr id="11" name="Image 10"/>
+          <p:cNvPicPr>
+            <a:picLocks noChangeAspect="1"/>
+          </p:cNvPicPr>
+          <p:nvPr/>
+        </p:nvPicPr>
+        <p:blipFill rotWithShape="1">
+          <a:blip r:embed="rId5">
+            <a:extLst>
+              <a:ext uri="{28A0092B-C50C-407E-A947-70E740481C1C}">
+                <a14:useLocalDpi xmlns:a14="http://schemas.microsoft.com/office/drawing/2010/main" val="0"/>
+              </a:ext>
+            </a:extLst>
+          </a:blip>
+          <a:srcRect t="30176"/>
+          <a:stretch/>
+        </p:blipFill>
+        <p:spPr>
+          <a:xfrm>
+            <a:off x="4801387" y="3199576"/>
+            <a:ext cx="3896705" cy="2040624"/>
+          </a:xfrm>
+          <a:prstGeom prst="rect">
+            <a:avLst/>
+          </a:prstGeom>
+        </p:spPr>
+      </p:pic>
+      <p:pic>
+        <p:nvPicPr>
+          <p:cNvPr id="12" name="Image 11"/>
+          <p:cNvPicPr>
+            <a:picLocks noChangeAspect="1"/>
+          </p:cNvPicPr>
+          <p:nvPr/>
+        </p:nvPicPr>
+        <p:blipFill rotWithShape="1">
+          <a:blip r:embed="rId6">
+            <a:extLst>
+              <a:ext uri="{28A0092B-C50C-407E-A947-70E740481C1C}">
+                <a14:useLocalDpi xmlns:a14="http://schemas.microsoft.com/office/drawing/2010/main" val="0"/>
+              </a:ext>
+            </a:extLst>
+          </a:blip>
+          <a:srcRect t="29819"/>
+          <a:stretch/>
+        </p:blipFill>
+        <p:spPr>
+          <a:xfrm>
+            <a:off x="4801387" y="1042153"/>
+            <a:ext cx="3896705" cy="2051062"/>
+          </a:xfrm>
+          <a:prstGeom prst="rect">
+            <a:avLst/>
+          </a:prstGeom>
+        </p:spPr>
+      </p:pic>
+    </p:spTree>
+    <p:extLst>
+      <p:ext uri="{BB962C8B-B14F-4D97-AF65-F5344CB8AC3E}">
+        <p14:creationId xmlns:p14="http://schemas.microsoft.com/office/powerpoint/2010/main" val="837665692"/>
       </p:ext>
     </p:extLst>
   </p:cSld>
@@ -7843,11 +8696,7 @@
             </a:r>
             <a:r>
               <a:rPr lang="en-US" dirty="0" smtClean="0"/>
-              <a:t> </a:t>
-            </a:r>
-            <a:r>
-              <a:rPr lang="en-US" dirty="0" smtClean="0"/>
-              <a:t>platform for tests </a:t>
+              <a:t> platform for tests </a:t>
             </a:r>
             <a:endParaRPr lang="en-US" dirty="0"/>
           </a:p>
@@ -8066,15 +8915,7 @@
                   <a:schemeClr val="tx1"/>
                 </a:solidFill>
               </a:rPr>
-              <a:t> </a:t>
-            </a:r>
-            <a:r>
-              <a:rPr lang="fr-FR" sz="900" dirty="0" smtClean="0">
-                <a:solidFill>
-                  <a:schemeClr val="tx1"/>
-                </a:solidFill>
-              </a:rPr>
-              <a:t>limitation</a:t>
+              <a:t> limitation</a:t>
             </a:r>
           </a:p>
           <a:p>
@@ -8391,15 +9232,7 @@
                   <a:schemeClr val="tx1"/>
                 </a:solidFill>
               </a:rPr>
-              <a:t> </a:t>
-            </a:r>
-            <a:r>
-              <a:rPr lang="fr-FR" sz="900" dirty="0" smtClean="0">
-                <a:solidFill>
-                  <a:schemeClr val="tx1"/>
-                </a:solidFill>
-              </a:rPr>
-              <a:t>limitation</a:t>
+              <a:t> limitation</a:t>
             </a:r>
           </a:p>
         </p:txBody>
@@ -10284,38 +11117,8 @@
                 <a:ea typeface="Arial" charset="0"/>
                 <a:cs typeface="Arial" charset="0"/>
               </a:rPr>
-              <a:t>PICO-QUIC </a:t>
-            </a:r>
-            <a:r>
-              <a:rPr lang="en-US" sz="1400" dirty="0" smtClean="0">
-                <a:solidFill>
-                  <a:srgbClr val="002060"/>
-                </a:solidFill>
-                <a:latin typeface="Arial" charset="0"/>
-                <a:ea typeface="Arial" charset="0"/>
-                <a:cs typeface="Arial" charset="0"/>
-              </a:rPr>
-              <a:t>(</a:t>
-            </a:r>
-            <a:r>
-              <a:rPr lang="en-US" sz="1400" dirty="0" smtClean="0">
-                <a:solidFill>
-                  <a:srgbClr val="002060"/>
-                </a:solidFill>
-                <a:latin typeface="Arial" charset="0"/>
-                <a:ea typeface="Arial" charset="0"/>
-                <a:cs typeface="Arial" charset="0"/>
-              </a:rPr>
-              <a:t>Version v0.24d) client </a:t>
-            </a:r>
-            <a:endParaRPr lang="en-US" sz="1400" dirty="0" smtClean="0">
-              <a:solidFill>
-                <a:srgbClr val="002060"/>
-              </a:solidFill>
-              <a:latin typeface="Arial" charset="0"/>
-              <a:ea typeface="Arial" charset="0"/>
-              <a:cs typeface="Arial" charset="0"/>
-            </a:endParaRPr>
+              <a:t>PICO-QUIC (Version v0.24d) client </a:t>
+            </a:r>
           </a:p>
           <a:p>
             <a:pPr marL="570037" lvl="1" indent="-171450">
@@ -10392,18 +11195,7 @@
                 <a:ea typeface="Arial" charset="0"/>
                 <a:cs typeface="Arial" charset="0"/>
               </a:rPr>
-              <a:t>2.3.0-DEV@9f65c27) </a:t>
-            </a:r>
-            <a:r>
-              <a:rPr lang="en-US" sz="1400" dirty="0" smtClean="0">
-                <a:solidFill>
-                  <a:srgbClr val="002060"/>
-                </a:solidFill>
-                <a:latin typeface="Arial" charset="0"/>
-                <a:ea typeface="Arial" charset="0"/>
-                <a:cs typeface="Arial" charset="0"/>
-              </a:rPr>
-              <a:t>: the objectives are not met</a:t>
+              <a:t>2.3.0-DEV@9f65c27) : the objectives are not met</a:t>
             </a:r>
           </a:p>
           <a:p>

</xml_diff>